<commit_message>
Updated DB diagram and risks
</commit_message>
<xml_diff>
--- a/SOW/הצעת פרוייקט מצגת.pptx
+++ b/SOW/הצעת פרוייקט מצגת.pptx
@@ -292,7 +292,7 @@
             <a:fld id="{F9119E2C-183D-45EA-B4E8-412AD0C4EF42}" type="datetimeFigureOut">
               <a:rPr lang="en-US" smtClean="0"/>
               <a:pPr/>
-              <a:t>3/9/2013</a:t>
+              <a:t>4/21/2013</a:t>
             </a:fld>
             <a:endParaRPr lang="en-US"/>
           </a:p>
@@ -459,7 +459,7 @@
             <a:fld id="{F9119E2C-183D-45EA-B4E8-412AD0C4EF42}" type="datetimeFigureOut">
               <a:rPr lang="en-US" smtClean="0"/>
               <a:pPr/>
-              <a:t>3/9/2013</a:t>
+              <a:t>4/21/2013</a:t>
             </a:fld>
             <a:endParaRPr lang="en-US"/>
           </a:p>
@@ -636,7 +636,7 @@
             <a:fld id="{F9119E2C-183D-45EA-B4E8-412AD0C4EF42}" type="datetimeFigureOut">
               <a:rPr lang="en-US" smtClean="0"/>
               <a:pPr/>
-              <a:t>3/9/2013</a:t>
+              <a:t>4/21/2013</a:t>
             </a:fld>
             <a:endParaRPr lang="en-US"/>
           </a:p>
@@ -803,7 +803,7 @@
             <a:fld id="{F9119E2C-183D-45EA-B4E8-412AD0C4EF42}" type="datetimeFigureOut">
               <a:rPr lang="en-US" smtClean="0"/>
               <a:pPr/>
-              <a:t>3/9/2013</a:t>
+              <a:t>4/21/2013</a:t>
             </a:fld>
             <a:endParaRPr lang="en-US"/>
           </a:p>
@@ -1046,7 +1046,7 @@
             <a:fld id="{F9119E2C-183D-45EA-B4E8-412AD0C4EF42}" type="datetimeFigureOut">
               <a:rPr lang="en-US" smtClean="0"/>
               <a:pPr/>
-              <a:t>3/9/2013</a:t>
+              <a:t>4/21/2013</a:t>
             </a:fld>
             <a:endParaRPr lang="en-US"/>
           </a:p>
@@ -1331,7 +1331,7 @@
             <a:fld id="{F9119E2C-183D-45EA-B4E8-412AD0C4EF42}" type="datetimeFigureOut">
               <a:rPr lang="en-US" smtClean="0"/>
               <a:pPr/>
-              <a:t>3/9/2013</a:t>
+              <a:t>4/21/2013</a:t>
             </a:fld>
             <a:endParaRPr lang="en-US"/>
           </a:p>
@@ -1750,7 +1750,7 @@
             <a:fld id="{F9119E2C-183D-45EA-B4E8-412AD0C4EF42}" type="datetimeFigureOut">
               <a:rPr lang="en-US" smtClean="0"/>
               <a:pPr/>
-              <a:t>3/9/2013</a:t>
+              <a:t>4/21/2013</a:t>
             </a:fld>
             <a:endParaRPr lang="en-US"/>
           </a:p>
@@ -1865,7 +1865,7 @@
             <a:fld id="{F9119E2C-183D-45EA-B4E8-412AD0C4EF42}" type="datetimeFigureOut">
               <a:rPr lang="en-US" smtClean="0"/>
               <a:pPr/>
-              <a:t>3/9/2013</a:t>
+              <a:t>4/21/2013</a:t>
             </a:fld>
             <a:endParaRPr lang="en-US"/>
           </a:p>
@@ -1957,7 +1957,7 @@
             <a:fld id="{F9119E2C-183D-45EA-B4E8-412AD0C4EF42}" type="datetimeFigureOut">
               <a:rPr lang="en-US" smtClean="0"/>
               <a:pPr/>
-              <a:t>3/9/2013</a:t>
+              <a:t>4/21/2013</a:t>
             </a:fld>
             <a:endParaRPr lang="en-US"/>
           </a:p>
@@ -2231,7 +2231,7 @@
             <a:fld id="{F9119E2C-183D-45EA-B4E8-412AD0C4EF42}" type="datetimeFigureOut">
               <a:rPr lang="en-US" smtClean="0"/>
               <a:pPr/>
-              <a:t>3/9/2013</a:t>
+              <a:t>4/21/2013</a:t>
             </a:fld>
             <a:endParaRPr lang="en-US"/>
           </a:p>
@@ -2481,7 +2481,7 @@
             <a:fld id="{F9119E2C-183D-45EA-B4E8-412AD0C4EF42}" type="datetimeFigureOut">
               <a:rPr lang="en-US" smtClean="0"/>
               <a:pPr/>
-              <a:t>3/9/2013</a:t>
+              <a:t>4/21/2013</a:t>
             </a:fld>
             <a:endParaRPr lang="en-US"/>
           </a:p>
@@ -2691,7 +2691,7 @@
             <a:fld id="{F9119E2C-183D-45EA-B4E8-412AD0C4EF42}" type="datetimeFigureOut">
               <a:rPr lang="en-US" smtClean="0"/>
               <a:pPr/>
-              <a:t>3/9/2013</a:t>
+              <a:t>4/21/2013</a:t>
             </a:fld>
             <a:endParaRPr lang="en-US"/>
           </a:p>
@@ -4839,7 +4839,6 @@
               <a:rPr lang="he-IL" sz="2400" dirty="0" smtClean="0"/>
               <a:t>קל ליישום.</a:t>
             </a:r>
-            <a:endParaRPr lang="he-IL" sz="2400" dirty="0" smtClean="0"/>
           </a:p>
           <a:p>
             <a:pPr algn="r" rtl="1">
@@ -4940,61 +4939,6 @@
       </p:sp>
       <p:sp>
         <p:nvSpPr>
-          <p:cNvPr id="10" name="מלבן מעוגל 7"/>
-          <p:cNvSpPr/>
-          <p:nvPr/>
-        </p:nvSpPr>
-        <p:spPr>
-          <a:xfrm>
-            <a:off x="1409700" y="4456770"/>
-            <a:ext cx="6858000" cy="1334430"/>
-          </a:xfrm>
-          <a:prstGeom prst="roundRect">
-            <a:avLst/>
-          </a:prstGeom>
-        </p:spPr>
-        <p:style>
-          <a:lnRef idx="2">
-            <a:schemeClr val="accent1"/>
-          </a:lnRef>
-          <a:fillRef idx="1">
-            <a:schemeClr val="lt1"/>
-          </a:fillRef>
-          <a:effectRef idx="0">
-            <a:schemeClr val="accent1"/>
-          </a:effectRef>
-          <a:fontRef idx="minor">
-            <a:schemeClr val="dk1"/>
-          </a:fontRef>
-        </p:style>
-        <p:txBody>
-          <a:bodyPr rtlCol="0" anchor="ctr"/>
-          <a:lstStyle/>
-          <a:p>
-            <a:pPr marL="342900" indent="-342900" algn="r" rtl="1">
-              <a:buFont typeface="Arial" pitchFamily="34" charset="0"/>
-              <a:buChar char="•"/>
-            </a:pPr>
-            <a:r>
-              <a:rPr lang="he-IL" sz="2400" dirty="0" smtClean="0"/>
-              <a:t>התנגדות של סופרים.</a:t>
-            </a:r>
-          </a:p>
-          <a:p>
-            <a:pPr marL="342900" indent="-342900" algn="r" rtl="1">
-              <a:buFont typeface="Arial" pitchFamily="34" charset="0"/>
-              <a:buChar char="•"/>
-            </a:pPr>
-            <a:r>
-              <a:rPr lang="he-IL" sz="2400" dirty="0" smtClean="0"/>
-              <a:t>מצריך מיפוי מתמיד של הסופרים (רעיון: באמצעות משתמשים?).</a:t>
-            </a:r>
-            <a:endParaRPr lang="en-US" sz="2400" dirty="0"/>
-          </a:p>
-        </p:txBody>
-      </p:sp>
-      <p:sp>
-        <p:nvSpPr>
           <p:cNvPr id="13" name="מלבן מעוגל 3"/>
           <p:cNvSpPr/>
           <p:nvPr/>
@@ -5037,6 +4981,60 @@
           </a:p>
         </p:txBody>
       </p:sp>
+      <p:pic>
+        <p:nvPicPr>
+          <p:cNvPr id="1026" name="Picture 2"/>
+          <p:cNvPicPr>
+            <a:picLocks noChangeAspect="1" noChangeArrowheads="1"/>
+          </p:cNvPicPr>
+          <p:nvPr/>
+        </p:nvPicPr>
+        <p:blipFill>
+          <a:blip r:embed="rId2">
+            <a:extLst>
+              <a:ext uri="{28A0092B-C50C-407E-A947-70E740481C1C}">
+                <a14:useLocalDpi xmlns:a14="http://schemas.microsoft.com/office/drawing/2010/main" val="0"/>
+              </a:ext>
+            </a:extLst>
+          </a:blip>
+          <a:srcRect/>
+          <a:stretch>
+            <a:fillRect/>
+          </a:stretch>
+        </p:blipFill>
+        <p:spPr bwMode="auto">
+          <a:xfrm>
+            <a:off x="914400" y="4572000"/>
+            <a:ext cx="7312656" cy="1879600"/>
+          </a:xfrm>
+          <a:prstGeom prst="rect">
+            <a:avLst/>
+          </a:prstGeom>
+          <a:noFill/>
+          <a:ln>
+            <a:noFill/>
+          </a:ln>
+          <a:extLst>
+            <a:ext uri="{909E8E84-426E-40DD-AFC4-6F175D3DCCD1}">
+              <a14:hiddenFill xmlns:a14="http://schemas.microsoft.com/office/drawing/2010/main">
+                <a:solidFill>
+                  <a:schemeClr val="accent1"/>
+                </a:solidFill>
+              </a14:hiddenFill>
+            </a:ext>
+            <a:ext uri="{91240B29-F687-4F45-9708-019B960494DF}">
+              <a14:hiddenLine xmlns:a14="http://schemas.microsoft.com/office/drawing/2010/main" w="9525">
+                <a:solidFill>
+                  <a:schemeClr val="tx1"/>
+                </a:solidFill>
+                <a:miter lim="800000"/>
+                <a:headEnd/>
+                <a:tailEnd/>
+              </a14:hiddenLine>
+            </a:ext>
+          </a:extLst>
+        </p:spPr>
+      </p:pic>
     </p:spTree>
   </p:cSld>
   <p:clrMapOvr>
@@ -5103,59 +5101,6 @@
                       </p:childTnLst>
                     </p:cTn>
                   </p:par>
-                  <p:par>
-                    <p:cTn id="8" fill="hold">
-                      <p:stCondLst>
-                        <p:cond delay="indefinite"/>
-                      </p:stCondLst>
-                      <p:childTnLst>
-                        <p:par>
-                          <p:cTn id="9" fill="hold">
-                            <p:stCondLst>
-                              <p:cond delay="0"/>
-                            </p:stCondLst>
-                            <p:childTnLst>
-                              <p:par>
-                                <p:cTn id="10" presetID="22" presetClass="entr" presetSubtype="2" fill="hold" grpId="0" nodeType="clickEffect">
-                                  <p:stCondLst>
-                                    <p:cond delay="0"/>
-                                  </p:stCondLst>
-                                  <p:childTnLst>
-                                    <p:set>
-                                      <p:cBhvr>
-                                        <p:cTn id="11" dur="1" fill="hold">
-                                          <p:stCondLst>
-                                            <p:cond delay="0"/>
-                                          </p:stCondLst>
-                                        </p:cTn>
-                                        <p:tgtEl>
-                                          <p:spTgt spid="10"/>
-                                        </p:tgtEl>
-                                        <p:attrNameLst>
-                                          <p:attrName>style.visibility</p:attrName>
-                                        </p:attrNameLst>
-                                      </p:cBhvr>
-                                      <p:to>
-                                        <p:strVal val="visible"/>
-                                      </p:to>
-                                    </p:set>
-                                    <p:animEffect transition="in" filter="wipe(right)">
-                                      <p:cBhvr>
-                                        <p:cTn id="12" dur="500"/>
-                                        <p:tgtEl>
-                                          <p:spTgt spid="10"/>
-                                        </p:tgtEl>
-                                      </p:cBhvr>
-                                    </p:animEffect>
-                                  </p:childTnLst>
-                                </p:cTn>
-                              </p:par>
-                            </p:childTnLst>
-                          </p:cTn>
-                        </p:par>
-                      </p:childTnLst>
-                    </p:cTn>
-                  </p:par>
                 </p:childTnLst>
               </p:cTn>
               <p:prevCondLst>
@@ -5179,7 +5124,6 @@
     </p:tnLst>
     <p:bldLst>
       <p:bldP spid="8" grpId="0" animBg="1"/>
-      <p:bldP spid="10" grpId="0" animBg="1"/>
     </p:bldLst>
   </p:timing>
 </p:sld>

</xml_diff>